<commit_message>
Work more on lecture 1 ppt
</commit_message>
<xml_diff>
--- a/COMP1631/Lecture_1.pptx
+++ b/COMP1631/Lecture_1.pptx
@@ -3182,7 +3182,7 @@
           <a:p>
             <a:fld id="{4BAEF67D-ECC0-43BE-81D0-02F4D6CDCF27}" type="datetimeFigureOut">
               <a:rPr lang="en-CA" smtClean="0"/>
-              <a:t>2024-01-06</a:t>
+              <a:t>2024-01-08</a:t>
             </a:fld>
             <a:endParaRPr lang="en-CA" dirty="0"/>
           </a:p>
@@ -3382,7 +3382,7 @@
           <a:p>
             <a:fld id="{4BAEF67D-ECC0-43BE-81D0-02F4D6CDCF27}" type="datetimeFigureOut">
               <a:rPr lang="en-CA" smtClean="0"/>
-              <a:t>2024-01-06</a:t>
+              <a:t>2024-01-08</a:t>
             </a:fld>
             <a:endParaRPr lang="en-CA" dirty="0"/>
           </a:p>
@@ -3592,7 +3592,7 @@
           <a:p>
             <a:fld id="{4BAEF67D-ECC0-43BE-81D0-02F4D6CDCF27}" type="datetimeFigureOut">
               <a:rPr lang="en-CA" smtClean="0"/>
-              <a:t>2024-01-06</a:t>
+              <a:t>2024-01-08</a:t>
             </a:fld>
             <a:endParaRPr lang="en-CA" dirty="0"/>
           </a:p>
@@ -3792,7 +3792,7 @@
           <a:p>
             <a:fld id="{4BAEF67D-ECC0-43BE-81D0-02F4D6CDCF27}" type="datetimeFigureOut">
               <a:rPr lang="en-CA" smtClean="0"/>
-              <a:t>2024-01-06</a:t>
+              <a:t>2024-01-08</a:t>
             </a:fld>
             <a:endParaRPr lang="en-CA" dirty="0"/>
           </a:p>
@@ -4068,7 +4068,7 @@
           <a:p>
             <a:fld id="{4BAEF67D-ECC0-43BE-81D0-02F4D6CDCF27}" type="datetimeFigureOut">
               <a:rPr lang="en-CA" smtClean="0"/>
-              <a:t>2024-01-06</a:t>
+              <a:t>2024-01-08</a:t>
             </a:fld>
             <a:endParaRPr lang="en-CA" dirty="0"/>
           </a:p>
@@ -4336,7 +4336,7 @@
           <a:p>
             <a:fld id="{4BAEF67D-ECC0-43BE-81D0-02F4D6CDCF27}" type="datetimeFigureOut">
               <a:rPr lang="en-CA" smtClean="0"/>
-              <a:t>2024-01-06</a:t>
+              <a:t>2024-01-08</a:t>
             </a:fld>
             <a:endParaRPr lang="en-CA" dirty="0"/>
           </a:p>
@@ -4751,7 +4751,7 @@
           <a:p>
             <a:fld id="{4BAEF67D-ECC0-43BE-81D0-02F4D6CDCF27}" type="datetimeFigureOut">
               <a:rPr lang="en-CA" smtClean="0"/>
-              <a:t>2024-01-06</a:t>
+              <a:t>2024-01-08</a:t>
             </a:fld>
             <a:endParaRPr lang="en-CA" dirty="0"/>
           </a:p>
@@ -4893,7 +4893,7 @@
           <a:p>
             <a:fld id="{4BAEF67D-ECC0-43BE-81D0-02F4D6CDCF27}" type="datetimeFigureOut">
               <a:rPr lang="en-CA" smtClean="0"/>
-              <a:t>2024-01-06</a:t>
+              <a:t>2024-01-08</a:t>
             </a:fld>
             <a:endParaRPr lang="en-CA" dirty="0"/>
           </a:p>
@@ -5006,7 +5006,7 @@
           <a:p>
             <a:fld id="{4BAEF67D-ECC0-43BE-81D0-02F4D6CDCF27}" type="datetimeFigureOut">
               <a:rPr lang="en-CA" smtClean="0"/>
-              <a:t>2024-01-06</a:t>
+              <a:t>2024-01-08</a:t>
             </a:fld>
             <a:endParaRPr lang="en-CA" dirty="0"/>
           </a:p>
@@ -5319,7 +5319,7 @@
           <a:p>
             <a:fld id="{4BAEF67D-ECC0-43BE-81D0-02F4D6CDCF27}" type="datetimeFigureOut">
               <a:rPr lang="en-CA" smtClean="0"/>
-              <a:t>2024-01-06</a:t>
+              <a:t>2024-01-08</a:t>
             </a:fld>
             <a:endParaRPr lang="en-CA" dirty="0"/>
           </a:p>
@@ -5608,7 +5608,7 @@
           <a:p>
             <a:fld id="{4BAEF67D-ECC0-43BE-81D0-02F4D6CDCF27}" type="datetimeFigureOut">
               <a:rPr lang="en-CA" smtClean="0"/>
-              <a:t>2024-01-06</a:t>
+              <a:t>2024-01-08</a:t>
             </a:fld>
             <a:endParaRPr lang="en-CA" dirty="0"/>
           </a:p>
@@ -5851,7 +5851,7 @@
           <a:p>
             <a:fld id="{4BAEF67D-ECC0-43BE-81D0-02F4D6CDCF27}" type="datetimeFigureOut">
               <a:rPr lang="en-CA" smtClean="0"/>
-              <a:t>2024-01-06</a:t>
+              <a:t>2024-01-08</a:t>
             </a:fld>
             <a:endParaRPr lang="en-CA" dirty="0"/>
           </a:p>
@@ -9701,8 +9701,8 @@
             <a:chExt cx="111240" cy="176760"/>
           </a:xfrm>
         </p:grpSpPr>
-        <mc:AlternateContent xmlns:mc="http://schemas.openxmlformats.org/markup-compatibility/2006">
-          <mc:Choice xmlns:p14="http://schemas.microsoft.com/office/powerpoint/2010/main" Requires="p14">
+        <mc:AlternateContent xmlns:mc="http://schemas.openxmlformats.org/markup-compatibility/2006" xmlns:p14="http://schemas.microsoft.com/office/powerpoint/2010/main">
+          <mc:Choice Requires="p14">
             <p:contentPart p14:bwMode="auto" r:id="rId2">
               <p14:nvContentPartPr>
                 <p14:cNvPr id="6" name="Ink 5">
@@ -9721,7 +9721,7 @@
               </p14:xfrm>
             </p:contentPart>
           </mc:Choice>
-          <mc:Fallback>
+          <mc:Fallback xmlns="">
             <p:pic>
               <p:nvPicPr>
                 <p:cNvPr id="6" name="Ink 5">
@@ -9752,8 +9752,8 @@
             </p:pic>
           </mc:Fallback>
         </mc:AlternateContent>
-        <mc:AlternateContent xmlns:mc="http://schemas.openxmlformats.org/markup-compatibility/2006">
-          <mc:Choice xmlns:p14="http://schemas.microsoft.com/office/powerpoint/2010/main" Requires="p14">
+        <mc:AlternateContent xmlns:mc="http://schemas.openxmlformats.org/markup-compatibility/2006" xmlns:p14="http://schemas.microsoft.com/office/powerpoint/2010/main">
+          <mc:Choice Requires="p14">
             <p:contentPart p14:bwMode="auto" r:id="rId4">
               <p14:nvContentPartPr>
                 <p14:cNvPr id="7" name="Ink 6">
@@ -9772,7 +9772,7 @@
               </p14:xfrm>
             </p:contentPart>
           </mc:Choice>
-          <mc:Fallback>
+          <mc:Fallback xmlns="">
             <p:pic>
               <p:nvPicPr>
                 <p:cNvPr id="7" name="Ink 6">
@@ -9804,8 +9804,8 @@
           </mc:Fallback>
         </mc:AlternateContent>
       </p:grpSp>
-      <mc:AlternateContent xmlns:mc="http://schemas.openxmlformats.org/markup-compatibility/2006">
-        <mc:Choice xmlns:p14="http://schemas.microsoft.com/office/powerpoint/2010/main" Requires="p14">
+      <mc:AlternateContent xmlns:mc="http://schemas.openxmlformats.org/markup-compatibility/2006" xmlns:p14="http://schemas.microsoft.com/office/powerpoint/2010/main">
+        <mc:Choice Requires="p14">
           <p:contentPart p14:bwMode="auto" r:id="rId6">
             <p14:nvContentPartPr>
               <p14:cNvPr id="9" name="Ink 8">
@@ -9824,7 +9824,7 @@
             </p14:xfrm>
           </p:contentPart>
         </mc:Choice>
-        <mc:Fallback>
+        <mc:Fallback xmlns="">
           <p:pic>
             <p:nvPicPr>
               <p:cNvPr id="9" name="Ink 8">
@@ -9855,8 +9855,8 @@
           </p:pic>
         </mc:Fallback>
       </mc:AlternateContent>
-      <mc:AlternateContent xmlns:mc="http://schemas.openxmlformats.org/markup-compatibility/2006">
-        <mc:Choice xmlns:p14="http://schemas.microsoft.com/office/powerpoint/2010/main" Requires="p14">
+      <mc:AlternateContent xmlns:mc="http://schemas.openxmlformats.org/markup-compatibility/2006" xmlns:p14="http://schemas.microsoft.com/office/powerpoint/2010/main">
+        <mc:Choice Requires="p14">
           <p:contentPart p14:bwMode="auto" r:id="rId8">
             <p14:nvContentPartPr>
               <p14:cNvPr id="11" name="Ink 10">
@@ -9875,7 +9875,7 @@
             </p14:xfrm>
           </p:contentPart>
         </mc:Choice>
-        <mc:Fallback>
+        <mc:Fallback xmlns="">
           <p:pic>
             <p:nvPicPr>
               <p:cNvPr id="11" name="Ink 10">
@@ -9926,8 +9926,8 @@
             <a:chExt cx="121320" cy="288720"/>
           </a:xfrm>
         </p:grpSpPr>
-        <mc:AlternateContent xmlns:mc="http://schemas.openxmlformats.org/markup-compatibility/2006">
-          <mc:Choice xmlns:p14="http://schemas.microsoft.com/office/powerpoint/2010/main" Requires="p14">
+        <mc:AlternateContent xmlns:mc="http://schemas.openxmlformats.org/markup-compatibility/2006" xmlns:p14="http://schemas.microsoft.com/office/powerpoint/2010/main">
+          <mc:Choice Requires="p14">
             <p:contentPart p14:bwMode="auto" r:id="rId10">
               <p14:nvContentPartPr>
                 <p14:cNvPr id="13" name="Ink 12">
@@ -9946,7 +9946,7 @@
               </p14:xfrm>
             </p:contentPart>
           </mc:Choice>
-          <mc:Fallback>
+          <mc:Fallback xmlns="">
             <p:pic>
               <p:nvPicPr>
                 <p:cNvPr id="13" name="Ink 12">
@@ -9977,8 +9977,8 @@
             </p:pic>
           </mc:Fallback>
         </mc:AlternateContent>
-        <mc:AlternateContent xmlns:mc="http://schemas.openxmlformats.org/markup-compatibility/2006">
-          <mc:Choice xmlns:p14="http://schemas.microsoft.com/office/powerpoint/2010/main" Requires="p14">
+        <mc:AlternateContent xmlns:mc="http://schemas.openxmlformats.org/markup-compatibility/2006" xmlns:p14="http://schemas.microsoft.com/office/powerpoint/2010/main">
+          <mc:Choice Requires="p14">
             <p:contentPart p14:bwMode="auto" r:id="rId12">
               <p14:nvContentPartPr>
                 <p14:cNvPr id="15" name="Ink 14">
@@ -9997,7 +9997,7 @@
               </p14:xfrm>
             </p:contentPart>
           </mc:Choice>
-          <mc:Fallback>
+          <mc:Fallback xmlns="">
             <p:pic>
               <p:nvPicPr>
                 <p:cNvPr id="15" name="Ink 14">
@@ -10049,8 +10049,8 @@
             <a:chExt cx="112680" cy="237240"/>
           </a:xfrm>
         </p:grpSpPr>
-        <mc:AlternateContent xmlns:mc="http://schemas.openxmlformats.org/markup-compatibility/2006">
-          <mc:Choice xmlns:p14="http://schemas.microsoft.com/office/powerpoint/2010/main" Requires="p14">
+        <mc:AlternateContent xmlns:mc="http://schemas.openxmlformats.org/markup-compatibility/2006" xmlns:p14="http://schemas.microsoft.com/office/powerpoint/2010/main">
+          <mc:Choice Requires="p14">
             <p:contentPart p14:bwMode="auto" r:id="rId14">
               <p14:nvContentPartPr>
                 <p14:cNvPr id="17" name="Ink 16">
@@ -10069,7 +10069,7 @@
               </p14:xfrm>
             </p:contentPart>
           </mc:Choice>
-          <mc:Fallback>
+          <mc:Fallback xmlns="">
             <p:pic>
               <p:nvPicPr>
                 <p:cNvPr id="17" name="Ink 16">
@@ -10100,8 +10100,8 @@
             </p:pic>
           </mc:Fallback>
         </mc:AlternateContent>
-        <mc:AlternateContent xmlns:mc="http://schemas.openxmlformats.org/markup-compatibility/2006">
-          <mc:Choice xmlns:p14="http://schemas.microsoft.com/office/powerpoint/2010/main" Requires="p14">
+        <mc:AlternateContent xmlns:mc="http://schemas.openxmlformats.org/markup-compatibility/2006" xmlns:p14="http://schemas.microsoft.com/office/powerpoint/2010/main">
+          <mc:Choice Requires="p14">
             <p:contentPart p14:bwMode="auto" r:id="rId16">
               <p14:nvContentPartPr>
                 <p14:cNvPr id="18" name="Ink 17">
@@ -10120,7 +10120,7 @@
               </p14:xfrm>
             </p:contentPart>
           </mc:Choice>
-          <mc:Fallback>
+          <mc:Fallback xmlns="">
             <p:pic>
               <p:nvPicPr>
                 <p:cNvPr id="18" name="Ink 17">
@@ -10152,8 +10152,8 @@
           </mc:Fallback>
         </mc:AlternateContent>
       </p:grpSp>
-      <mc:AlternateContent xmlns:mc="http://schemas.openxmlformats.org/markup-compatibility/2006">
-        <mc:Choice xmlns:p14="http://schemas.microsoft.com/office/powerpoint/2010/main" Requires="p14">
+      <mc:AlternateContent xmlns:mc="http://schemas.openxmlformats.org/markup-compatibility/2006" xmlns:p14="http://schemas.microsoft.com/office/powerpoint/2010/main">
+        <mc:Choice Requires="p14">
           <p:contentPart p14:bwMode="auto" r:id="rId18">
             <p14:nvContentPartPr>
               <p14:cNvPr id="21" name="Ink 20">
@@ -10172,7 +10172,7 @@
             </p14:xfrm>
           </p:contentPart>
         </mc:Choice>
-        <mc:Fallback>
+        <mc:Fallback xmlns="">
           <p:pic>
             <p:nvPicPr>
               <p:cNvPr id="21" name="Ink 20">
@@ -10203,8 +10203,8 @@
           </p:pic>
         </mc:Fallback>
       </mc:AlternateContent>
-      <mc:AlternateContent xmlns:mc="http://schemas.openxmlformats.org/markup-compatibility/2006">
-        <mc:Choice xmlns:p14="http://schemas.microsoft.com/office/powerpoint/2010/main" Requires="p14">
+      <mc:AlternateContent xmlns:mc="http://schemas.openxmlformats.org/markup-compatibility/2006" xmlns:p14="http://schemas.microsoft.com/office/powerpoint/2010/main">
+        <mc:Choice Requires="p14">
           <p:contentPart p14:bwMode="auto" r:id="rId20">
             <p14:nvContentPartPr>
               <p14:cNvPr id="22" name="Ink 21">
@@ -10223,7 +10223,7 @@
             </p14:xfrm>
           </p:contentPart>
         </mc:Choice>
-        <mc:Fallback>
+        <mc:Fallback xmlns="">
           <p:pic>
             <p:nvPicPr>
               <p:cNvPr id="22" name="Ink 21">
@@ -12389,6 +12389,8 @@
               <a:spcBef>
                 <a:spcPts val="0"/>
               </a:spcBef>
+              <a:buFont typeface="Courier New" panose="02070309020205020404" pitchFamily="49" charset="0"/>
+              <a:buChar char="o"/>
             </a:pPr>
             <a:r>
               <a:rPr lang="en-US" sz="1100" dirty="0">
@@ -12405,6 +12407,8 @@
               <a:spcBef>
                 <a:spcPts val="0"/>
               </a:spcBef>
+              <a:buFont typeface="Courier New" panose="02070309020205020404" pitchFamily="49" charset="0"/>
+              <a:buChar char="o"/>
             </a:pPr>
             <a:r>
               <a:rPr lang="en-US" sz="1100" dirty="0">
@@ -12421,6 +12425,8 @@
               <a:spcBef>
                 <a:spcPts val="0"/>
               </a:spcBef>
+              <a:buFont typeface="Courier New" panose="02070309020205020404" pitchFamily="49" charset="0"/>
+              <a:buChar char="o"/>
             </a:pPr>
             <a:r>
               <a:rPr lang="en-US" sz="1100" dirty="0">
@@ -12437,6 +12443,8 @@
               <a:spcBef>
                 <a:spcPts val="0"/>
               </a:spcBef>
+              <a:buFont typeface="Courier New" panose="02070309020205020404" pitchFamily="49" charset="0"/>
+              <a:buChar char="o"/>
             </a:pPr>
             <a:r>
               <a:rPr lang="en-US" sz="1100" dirty="0">
@@ -12453,6 +12461,8 @@
               <a:spcBef>
                 <a:spcPts val="0"/>
               </a:spcBef>
+              <a:buFont typeface="Courier New" panose="02070309020205020404" pitchFamily="49" charset="0"/>
+              <a:buChar char="o"/>
             </a:pPr>
             <a:r>
               <a:rPr lang="en-US" sz="1100" dirty="0">
@@ -12469,6 +12479,8 @@
               <a:spcBef>
                 <a:spcPts val="0"/>
               </a:spcBef>
+              <a:buFont typeface="Courier New" panose="02070309020205020404" pitchFamily="49" charset="0"/>
+              <a:buChar char="o"/>
             </a:pPr>
             <a:r>
               <a:rPr lang="en-US" sz="1100" dirty="0">
@@ -12485,6 +12497,8 @@
               <a:spcBef>
                 <a:spcPts val="0"/>
               </a:spcBef>
+              <a:buFont typeface="Courier New" panose="02070309020205020404" pitchFamily="49" charset="0"/>
+              <a:buChar char="o"/>
             </a:pPr>
             <a:r>
               <a:rPr lang="en-US" sz="1100" dirty="0">
@@ -12501,6 +12515,8 @@
               <a:spcBef>
                 <a:spcPts val="0"/>
               </a:spcBef>
+              <a:buFont typeface="Courier New" panose="02070309020205020404" pitchFamily="49" charset="0"/>
+              <a:buChar char="o"/>
             </a:pPr>
             <a:r>
               <a:rPr lang="en-US" sz="1100" dirty="0">
@@ -12533,6 +12549,8 @@
               <a:spcBef>
                 <a:spcPts val="0"/>
               </a:spcBef>
+              <a:buFont typeface="Courier New" panose="02070309020205020404" pitchFamily="49" charset="0"/>
+              <a:buChar char="o"/>
             </a:pPr>
             <a:r>
               <a:rPr lang="en-US" sz="1100" dirty="0">
@@ -12549,6 +12567,8 @@
               <a:spcBef>
                 <a:spcPts val="0"/>
               </a:spcBef>
+              <a:buFont typeface="Courier New" panose="02070309020205020404" pitchFamily="49" charset="0"/>
+              <a:buChar char="o"/>
             </a:pPr>
             <a:r>
               <a:rPr lang="en-US" sz="1100" dirty="0">
@@ -12565,6 +12585,8 @@
               <a:spcBef>
                 <a:spcPts val="0"/>
               </a:spcBef>
+              <a:buFont typeface="Courier New" panose="02070309020205020404" pitchFamily="49" charset="0"/>
+              <a:buChar char="o"/>
             </a:pPr>
             <a:r>
               <a:rPr lang="en-US" sz="1100" dirty="0">
@@ -12581,6 +12603,8 @@
               <a:spcBef>
                 <a:spcPts val="0"/>
               </a:spcBef>
+              <a:buFont typeface="Courier New" panose="02070309020205020404" pitchFamily="49" charset="0"/>
+              <a:buChar char="o"/>
             </a:pPr>
             <a:r>
               <a:rPr lang="en-US" sz="1100" dirty="0">
@@ -12597,6 +12621,8 @@
               <a:spcBef>
                 <a:spcPts val="0"/>
               </a:spcBef>
+              <a:buFont typeface="Courier New" panose="02070309020205020404" pitchFamily="49" charset="0"/>
+              <a:buChar char="o"/>
             </a:pPr>
             <a:r>
               <a:rPr lang="en-US" sz="1100" dirty="0">
@@ -12613,6 +12639,8 @@
               <a:spcBef>
                 <a:spcPts val="0"/>
               </a:spcBef>
+              <a:buFont typeface="Courier New" panose="02070309020205020404" pitchFamily="49" charset="0"/>
+              <a:buChar char="o"/>
             </a:pPr>
             <a:r>
               <a:rPr lang="en-US" sz="1100" dirty="0">
@@ -12629,6 +12657,8 @@
               <a:spcBef>
                 <a:spcPts val="0"/>
               </a:spcBef>
+              <a:buFont typeface="Courier New" panose="02070309020205020404" pitchFamily="49" charset="0"/>
+              <a:buChar char="o"/>
             </a:pPr>
             <a:r>
               <a:rPr lang="en-US" sz="1100" dirty="0">
@@ -12648,6 +12678,8 @@
               <a:spcAft>
                 <a:spcPts val="0"/>
               </a:spcAft>
+              <a:buFont typeface="Courier New" panose="02070309020205020404" pitchFamily="49" charset="0"/>
+              <a:buChar char="o"/>
             </a:pPr>
             <a:r>
               <a:rPr lang="en-US" sz="1100" dirty="0">
@@ -12667,6 +12699,8 @@
               <a:spcAft>
                 <a:spcPts val="0"/>
               </a:spcAft>
+              <a:buFont typeface="Courier New" panose="02070309020205020404" pitchFamily="49" charset="0"/>
+              <a:buChar char="o"/>
             </a:pPr>
             <a:r>
               <a:rPr lang="en-US" sz="1100" dirty="0">
@@ -12686,6 +12720,8 @@
               <a:spcAft>
                 <a:spcPts val="0"/>
               </a:spcAft>
+              <a:buFont typeface="Courier New" panose="02070309020205020404" pitchFamily="49" charset="0"/>
+              <a:buChar char="o"/>
             </a:pPr>
             <a:r>
               <a:rPr lang="en-US" sz="1100" dirty="0">
@@ -12705,6 +12741,8 @@
               <a:spcAft>
                 <a:spcPts val="0"/>
               </a:spcAft>
+              <a:buFont typeface="Courier New" panose="02070309020205020404" pitchFamily="49" charset="0"/>
+              <a:buChar char="o"/>
             </a:pPr>
             <a:r>
               <a:rPr lang="en-US" sz="1100" dirty="0">
@@ -12724,6 +12762,8 @@
               <a:spcAft>
                 <a:spcPts val="0"/>
               </a:spcAft>
+              <a:buFont typeface="Courier New" panose="02070309020205020404" pitchFamily="49" charset="0"/>
+              <a:buChar char="o"/>
             </a:pPr>
             <a:r>
               <a:rPr lang="en-US" sz="1100" dirty="0">
@@ -12743,6 +12783,8 @@
               <a:spcAft>
                 <a:spcPts val="0"/>
               </a:spcAft>
+              <a:buFont typeface="Courier New" panose="02070309020205020404" pitchFamily="49" charset="0"/>
+              <a:buChar char="o"/>
             </a:pPr>
             <a:r>
               <a:rPr lang="en-US" sz="1100" dirty="0">
@@ -12762,6 +12804,8 @@
               <a:spcAft>
                 <a:spcPts val="0"/>
               </a:spcAft>
+              <a:buFont typeface="Courier New" panose="02070309020205020404" pitchFamily="49" charset="0"/>
+              <a:buChar char="o"/>
             </a:pPr>
             <a:r>
               <a:rPr lang="en-US" sz="1100" dirty="0">
@@ -12774,6 +12818,10 @@
             </a:r>
           </a:p>
           <a:p>
+            <a:pPr>
+              <a:buFont typeface="Courier New" panose="02070309020205020404" pitchFamily="49" charset="0"/>
+              <a:buChar char="o"/>
+            </a:pPr>
             <a:endParaRPr lang="en-CA" sz="2000" dirty="0">
               <a:solidFill>
                 <a:schemeClr val="bg1"/>
@@ -12795,6 +12843,8 @@
               <a:spcBef>
                 <a:spcPts val="0"/>
               </a:spcBef>
+              <a:buFont typeface="Courier New" panose="02070309020205020404" pitchFamily="49" charset="0"/>
+              <a:buChar char="o"/>
             </a:pPr>
             <a:r>
               <a:rPr lang="en-US" sz="1100" dirty="0">
@@ -12811,6 +12861,8 @@
               <a:spcBef>
                 <a:spcPts val="0"/>
               </a:spcBef>
+              <a:buFont typeface="Courier New" panose="02070309020205020404" pitchFamily="49" charset="0"/>
+              <a:buChar char="o"/>
             </a:pPr>
             <a:r>
               <a:rPr lang="en-US" sz="1100" dirty="0">
@@ -12827,6 +12879,8 @@
               <a:spcBef>
                 <a:spcPts val="0"/>
               </a:spcBef>
+              <a:buFont typeface="Courier New" panose="02070309020205020404" pitchFamily="49" charset="0"/>
+              <a:buChar char="o"/>
             </a:pPr>
             <a:r>
               <a:rPr lang="en-US" sz="1100" dirty="0">
@@ -12843,6 +12897,8 @@
               <a:spcBef>
                 <a:spcPts val="0"/>
               </a:spcBef>
+              <a:buFont typeface="Courier New" panose="02070309020205020404" pitchFamily="49" charset="0"/>
+              <a:buChar char="o"/>
             </a:pPr>
             <a:r>
               <a:rPr lang="en-US" sz="1100" dirty="0">
@@ -12859,6 +12915,8 @@
               <a:spcBef>
                 <a:spcPts val="0"/>
               </a:spcBef>
+              <a:buFont typeface="Courier New" panose="02070309020205020404" pitchFamily="49" charset="0"/>
+              <a:buChar char="o"/>
             </a:pPr>
             <a:r>
               <a:rPr lang="en-US" sz="1100" dirty="0">
@@ -12875,6 +12933,8 @@
               <a:spcBef>
                 <a:spcPts val="0"/>
               </a:spcBef>
+              <a:buFont typeface="Courier New" panose="02070309020205020404" pitchFamily="49" charset="0"/>
+              <a:buChar char="o"/>
             </a:pPr>
             <a:r>
               <a:rPr lang="en-US" sz="1100" dirty="0">
@@ -12891,6 +12951,8 @@
               <a:spcBef>
                 <a:spcPts val="0"/>
               </a:spcBef>
+              <a:buFont typeface="Courier New" panose="02070309020205020404" pitchFamily="49" charset="0"/>
+              <a:buChar char="o"/>
             </a:pPr>
             <a:r>
               <a:rPr lang="en-US" sz="1100" dirty="0">
@@ -12907,6 +12969,8 @@
               <a:spcBef>
                 <a:spcPts val="0"/>
               </a:spcBef>
+              <a:buFont typeface="Courier New" panose="02070309020205020404" pitchFamily="49" charset="0"/>
+              <a:buChar char="o"/>
             </a:pPr>
             <a:r>
               <a:rPr lang="en-US" sz="1100" dirty="0">
@@ -12923,6 +12987,8 @@
               <a:spcBef>
                 <a:spcPts val="0"/>
               </a:spcBef>
+              <a:buFont typeface="Courier New" panose="02070309020205020404" pitchFamily="49" charset="0"/>
+              <a:buChar char="o"/>
             </a:pPr>
             <a:r>
               <a:rPr lang="en-US" sz="1100" dirty="0">
@@ -12939,6 +13005,8 @@
               <a:spcBef>
                 <a:spcPts val="0"/>
               </a:spcBef>
+              <a:buFont typeface="Courier New" panose="02070309020205020404" pitchFamily="49" charset="0"/>
+              <a:buChar char="o"/>
             </a:pPr>
             <a:r>
               <a:rPr lang="en-US" sz="1100" dirty="0">
@@ -12956,6 +13024,10 @@
             </a:endParaRPr>
           </a:p>
           <a:p>
+            <a:pPr>
+              <a:buFont typeface="Courier New" panose="02070309020205020404" pitchFamily="49" charset="0"/>
+              <a:buChar char="o"/>
+            </a:pPr>
             <a:endParaRPr lang="en-CA" sz="2000" dirty="0">
               <a:solidFill>
                 <a:schemeClr val="bg1"/>
@@ -12963,6 +13035,10 @@
             </a:endParaRPr>
           </a:p>
           <a:p>
+            <a:pPr>
+              <a:buFont typeface="Courier New" panose="02070309020205020404" pitchFamily="49" charset="0"/>
+              <a:buChar char="o"/>
+            </a:pPr>
             <a:endParaRPr lang="en-CA" sz="2000" dirty="0">
               <a:solidFill>
                 <a:schemeClr val="bg1"/>
@@ -12970,6 +13046,10 @@
             </a:endParaRPr>
           </a:p>
           <a:p>
+            <a:pPr>
+              <a:buFont typeface="Courier New" panose="02070309020205020404" pitchFamily="49" charset="0"/>
+              <a:buChar char="o"/>
+            </a:pPr>
             <a:endParaRPr lang="en-CA" sz="2000" dirty="0">
               <a:solidFill>
                 <a:schemeClr val="bg1"/>
@@ -12991,6 +13071,8 @@
               <a:spcBef>
                 <a:spcPts val="0"/>
               </a:spcBef>
+              <a:buFont typeface="Courier New" panose="02070309020205020404" pitchFamily="49" charset="0"/>
+              <a:buChar char="o"/>
             </a:pPr>
             <a:r>
               <a:rPr lang="en-US" sz="1200" dirty="0">
@@ -13007,6 +13089,8 @@
               <a:spcBef>
                 <a:spcPts val="0"/>
               </a:spcBef>
+              <a:buFont typeface="Courier New" panose="02070309020205020404" pitchFamily="49" charset="0"/>
+              <a:buChar char="o"/>
             </a:pPr>
             <a:r>
               <a:rPr lang="en-US" sz="1200" dirty="0">
@@ -13023,6 +13107,8 @@
               <a:spcBef>
                 <a:spcPts val="0"/>
               </a:spcBef>
+              <a:buFont typeface="Courier New" panose="02070309020205020404" pitchFamily="49" charset="0"/>
+              <a:buChar char="o"/>
             </a:pPr>
             <a:r>
               <a:rPr lang="en-US" sz="1200" dirty="0">
@@ -13039,6 +13125,8 @@
               <a:spcBef>
                 <a:spcPts val="0"/>
               </a:spcBef>
+              <a:buFont typeface="Courier New" panose="02070309020205020404" pitchFamily="49" charset="0"/>
+              <a:buChar char="o"/>
             </a:pPr>
             <a:r>
               <a:rPr lang="en-US" sz="1200" dirty="0">
@@ -13055,6 +13143,8 @@
               <a:spcBef>
                 <a:spcPts val="0"/>
               </a:spcBef>
+              <a:buFont typeface="Courier New" panose="02070309020205020404" pitchFamily="49" charset="0"/>
+              <a:buChar char="o"/>
             </a:pPr>
             <a:r>
               <a:rPr lang="en-US" sz="1200" dirty="0">
@@ -13071,6 +13161,8 @@
               <a:spcBef>
                 <a:spcPts val="0"/>
               </a:spcBef>
+              <a:buFont typeface="Courier New" panose="02070309020205020404" pitchFamily="49" charset="0"/>
+              <a:buChar char="o"/>
             </a:pPr>
             <a:r>
               <a:rPr lang="en-US" sz="1200" dirty="0">
@@ -13087,6 +13179,8 @@
               <a:spcBef>
                 <a:spcPts val="0"/>
               </a:spcBef>
+              <a:buFont typeface="Courier New" panose="02070309020205020404" pitchFamily="49" charset="0"/>
+              <a:buChar char="o"/>
             </a:pPr>
             <a:r>
               <a:rPr lang="en-US" sz="1200" dirty="0">
@@ -13103,6 +13197,8 @@
               <a:spcBef>
                 <a:spcPts val="0"/>
               </a:spcBef>
+              <a:buFont typeface="Courier New" panose="02070309020205020404" pitchFamily="49" charset="0"/>
+              <a:buChar char="o"/>
             </a:pPr>
             <a:r>
               <a:rPr lang="en-US" sz="1200" dirty="0">
@@ -13119,6 +13215,8 @@
               <a:spcBef>
                 <a:spcPts val="0"/>
               </a:spcBef>
+              <a:buFont typeface="Courier New" panose="02070309020205020404" pitchFamily="49" charset="0"/>
+              <a:buChar char="o"/>
             </a:pPr>
             <a:r>
               <a:rPr lang="en-US" sz="1200" dirty="0">
@@ -13135,6 +13233,8 @@
               <a:spcBef>
                 <a:spcPts val="0"/>
               </a:spcBef>
+              <a:buFont typeface="Courier New" panose="02070309020205020404" pitchFamily="49" charset="0"/>
+              <a:buChar char="o"/>
             </a:pPr>
             <a:r>
               <a:rPr lang="en-US" sz="1200" dirty="0">
@@ -13151,6 +13251,8 @@
               <a:spcBef>
                 <a:spcPts val="0"/>
               </a:spcBef>
+              <a:buFont typeface="Courier New" panose="02070309020205020404" pitchFamily="49" charset="0"/>
+              <a:buChar char="o"/>
             </a:pPr>
             <a:r>
               <a:rPr lang="en-US" sz="1200" dirty="0">
@@ -14260,15 +14362,175 @@
         </p:spPr>
         <p:txBody>
           <a:bodyPr>
-            <a:normAutofit/>
+            <a:normAutofit fontScale="85000" lnSpcReduction="20000"/>
           </a:bodyPr>
           <a:lstStyle/>
           <a:p>
-            <a:endParaRPr lang="en-CA" sz="2000" dirty="0">
-              <a:solidFill>
-                <a:schemeClr val="bg1"/>
-              </a:solidFill>
-            </a:endParaRPr>
+            <a:pPr marL="0" indent="0">
+              <a:buNone/>
+            </a:pPr>
+            <a:r>
+              <a:rPr lang="en-CA" sz="2000" dirty="0">
+                <a:solidFill>
+                  <a:schemeClr val="bg1"/>
+                </a:solidFill>
+              </a:rPr>
+              <a:t>Module 5</a:t>
+            </a:r>
+          </a:p>
+          <a:p>
+            <a:pPr>
+              <a:buFont typeface="Wingdings" panose="05000000000000000000" pitchFamily="2" charset="2"/>
+              <a:buChar char="q"/>
+            </a:pPr>
+            <a:r>
+              <a:rPr lang="en-US" sz="1800" dirty="0">
+                <a:solidFill>
+                  <a:schemeClr val="bg2"/>
+                </a:solidFill>
+              </a:rPr>
+              <a:t>Copy worksheets between workbooks</a:t>
+            </a:r>
+          </a:p>
+          <a:p>
+            <a:pPr>
+              <a:buFont typeface="Wingdings" panose="05000000000000000000" pitchFamily="2" charset="2"/>
+              <a:buChar char="q"/>
+            </a:pPr>
+            <a:r>
+              <a:rPr lang="en-US" sz="1800" dirty="0">
+                <a:solidFill>
+                  <a:schemeClr val="bg2"/>
+                </a:solidFill>
+              </a:rPr>
+              <a:t>View a workbook in multiple windows</a:t>
+            </a:r>
+          </a:p>
+          <a:p>
+            <a:pPr>
+              <a:buFont typeface="Wingdings" panose="05000000000000000000" pitchFamily="2" charset="2"/>
+              <a:buChar char="q"/>
+            </a:pPr>
+            <a:r>
+              <a:rPr lang="en-US" sz="1800" dirty="0">
+                <a:solidFill>
+                  <a:schemeClr val="bg2"/>
+                </a:solidFill>
+              </a:rPr>
+              <a:t>Organize worksheets in a worksheet group</a:t>
+            </a:r>
+          </a:p>
+          <a:p>
+            <a:pPr>
+              <a:buFont typeface="Wingdings" panose="05000000000000000000" pitchFamily="2" charset="2"/>
+              <a:buChar char="q"/>
+            </a:pPr>
+            <a:r>
+              <a:rPr lang="en-US" sz="1800" dirty="0">
+                <a:solidFill>
+                  <a:schemeClr val="bg2"/>
+                </a:solidFill>
+              </a:rPr>
+              <a:t>Write a 3-D reference</a:t>
+            </a:r>
+          </a:p>
+          <a:p>
+            <a:pPr>
+              <a:buFont typeface="Wingdings" panose="05000000000000000000" pitchFamily="2" charset="2"/>
+              <a:buChar char="q"/>
+            </a:pPr>
+            <a:r>
+              <a:rPr lang="en-US" sz="1800" dirty="0">
+                <a:solidFill>
+                  <a:schemeClr val="bg2"/>
+                </a:solidFill>
+              </a:rPr>
+              <a:t>Write an external reference</a:t>
+            </a:r>
+          </a:p>
+          <a:p>
+            <a:pPr>
+              <a:buFont typeface="Wingdings" panose="05000000000000000000" pitchFamily="2" charset="2"/>
+              <a:buChar char="q"/>
+            </a:pPr>
+            <a:r>
+              <a:rPr lang="en-US" sz="1800" dirty="0">
+                <a:solidFill>
+                  <a:schemeClr val="bg2"/>
+                </a:solidFill>
+              </a:rPr>
+              <a:t>Manage the security features of linked documents</a:t>
+            </a:r>
+          </a:p>
+          <a:p>
+            <a:pPr>
+              <a:buFont typeface="Wingdings" panose="05000000000000000000" pitchFamily="2" charset="2"/>
+              <a:buChar char="q"/>
+            </a:pPr>
+            <a:r>
+              <a:rPr lang="en-US" sz="1800" dirty="0">
+                <a:solidFill>
+                  <a:schemeClr val="bg2"/>
+                </a:solidFill>
+              </a:rPr>
+              <a:t>Create a hyperlink to a document source</a:t>
+            </a:r>
+          </a:p>
+          <a:p>
+            <a:pPr>
+              <a:buFont typeface="Wingdings" panose="05000000000000000000" pitchFamily="2" charset="2"/>
+              <a:buChar char="q"/>
+            </a:pPr>
+            <a:r>
+              <a:rPr lang="en-US" sz="1800" dirty="0">
+                <a:solidFill>
+                  <a:schemeClr val="bg2"/>
+                </a:solidFill>
+              </a:rPr>
+              <a:t>Link to an email address</a:t>
+            </a:r>
+          </a:p>
+          <a:p>
+            <a:pPr>
+              <a:buFont typeface="Wingdings" panose="05000000000000000000" pitchFamily="2" charset="2"/>
+              <a:buChar char="q"/>
+            </a:pPr>
+            <a:r>
+              <a:rPr lang="en-US" sz="1800" dirty="0">
+                <a:solidFill>
+                  <a:schemeClr val="bg2"/>
+                </a:solidFill>
+              </a:rPr>
+              <a:t>Create and apply a named range</a:t>
+            </a:r>
+          </a:p>
+          <a:p>
+            <a:pPr>
+              <a:buFont typeface="Wingdings" panose="05000000000000000000" pitchFamily="2" charset="2"/>
+              <a:buChar char="q"/>
+            </a:pPr>
+            <a:r>
+              <a:rPr lang="en-US" sz="1800" dirty="0">
+                <a:solidFill>
+                  <a:schemeClr val="bg2"/>
+                </a:solidFill>
+              </a:rPr>
+              <a:t>Work with name scope</a:t>
+            </a:r>
+          </a:p>
+          <a:p>
+            <a:pPr>
+              <a:buFont typeface="Wingdings" panose="05000000000000000000" pitchFamily="2" charset="2"/>
+              <a:buChar char="q"/>
+            </a:pPr>
+            <a:r>
+              <a:rPr lang="en-US" sz="1800" dirty="0">
+                <a:solidFill>
+                  <a:schemeClr val="bg2"/>
+                </a:solidFill>
+              </a:rPr>
+              <a:t>Create a workbook template</a:t>
+            </a:r>
           </a:p>
         </p:txBody>
       </p:sp>

</xml_diff>